<commit_message>
add resources links for images
</commit_message>
<xml_diff>
--- a/mongo.pptx
+++ b/mongo.pptx
@@ -225,6 +225,7 @@
           <a:p>
             <a:fld id="{44EEA061-6E3C-4041-AB5B-95EBC9B50AA1}" type="datetimeFigureOut">
               <a:rPr lang="en-US" smtClean="0"/>
+              <a:pPr/>
               <a:t>3/2/10</a:t>
             </a:fld>
             <a:endParaRPr lang="en-US"/>
@@ -386,6 +387,7 @@
           <a:p>
             <a:fld id="{3A07B820-47FA-134C-9439-E1785E2AFBF4}" type="slidenum">
               <a:rPr lang="en-US" smtClean="0"/>
+              <a:pPr/>
               <a:t>‹#›</a:t>
             </a:fld>
             <a:endParaRPr lang="en-US"/>
@@ -565,6 +567,7 @@
           <a:p>
             <a:fld id="{3A07B820-47FA-134C-9439-E1785E2AFBF4}" type="slidenum">
               <a:rPr lang="en-US" smtClean="0"/>
+              <a:pPr/>
               <a:t>3</a:t>
             </a:fld>
             <a:endParaRPr lang="en-US"/>
@@ -672,6 +675,7 @@
           <a:p>
             <a:fld id="{3A07B820-47FA-134C-9439-E1785E2AFBF4}" type="slidenum">
               <a:rPr lang="en-US" smtClean="0"/>
+              <a:pPr/>
               <a:t>13</a:t>
             </a:fld>
             <a:endParaRPr lang="en-US"/>
@@ -767,6 +771,7 @@
           <a:p>
             <a:fld id="{3A07B820-47FA-134C-9439-E1785E2AFBF4}" type="slidenum">
               <a:rPr lang="en-US" smtClean="0"/>
+              <a:pPr/>
               <a:t>14</a:t>
             </a:fld>
             <a:endParaRPr lang="en-US"/>
@@ -907,6 +912,7 @@
           <a:p>
             <a:fld id="{3A07B820-47FA-134C-9439-E1785E2AFBF4}" type="slidenum">
               <a:rPr lang="en-US" smtClean="0"/>
+              <a:pPr/>
               <a:t>15</a:t>
             </a:fld>
             <a:endParaRPr lang="en-US"/>
@@ -1014,6 +1020,7 @@
           <a:p>
             <a:fld id="{3A07B820-47FA-134C-9439-E1785E2AFBF4}" type="slidenum">
               <a:rPr lang="en-US" smtClean="0"/>
+              <a:pPr/>
               <a:t>16</a:t>
             </a:fld>
             <a:endParaRPr lang="en-US"/>
@@ -1143,6 +1150,7 @@
           <a:p>
             <a:fld id="{3A07B820-47FA-134C-9439-E1785E2AFBF4}" type="slidenum">
               <a:rPr lang="en-US" smtClean="0"/>
+              <a:pPr/>
               <a:t>17</a:t>
             </a:fld>
             <a:endParaRPr lang="en-US"/>
@@ -1240,6 +1248,7 @@
           <a:p>
             <a:fld id="{3A07B820-47FA-134C-9439-E1785E2AFBF4}" type="slidenum">
               <a:rPr lang="en-US" smtClean="0"/>
+              <a:pPr/>
               <a:t>18</a:t>
             </a:fld>
             <a:endParaRPr lang="en-US"/>
@@ -1329,6 +1338,7 @@
           <a:p>
             <a:fld id="{3A07B820-47FA-134C-9439-E1785E2AFBF4}" type="slidenum">
               <a:rPr lang="en-US" smtClean="0"/>
+              <a:pPr/>
               <a:t>19</a:t>
             </a:fld>
             <a:endParaRPr lang="en-US"/>
@@ -1414,6 +1424,7 @@
           <a:p>
             <a:fld id="{3A07B820-47FA-134C-9439-E1785E2AFBF4}" type="slidenum">
               <a:rPr lang="en-US" smtClean="0"/>
+              <a:pPr/>
               <a:t>20</a:t>
             </a:fld>
             <a:endParaRPr lang="en-US"/>
@@ -1495,6 +1506,7 @@
           <a:p>
             <a:fld id="{3A07B820-47FA-134C-9439-E1785E2AFBF4}" type="slidenum">
               <a:rPr lang="en-US" smtClean="0"/>
+              <a:pPr/>
               <a:t>21</a:t>
             </a:fld>
             <a:endParaRPr lang="en-US"/>
@@ -1610,6 +1622,7 @@
           <a:p>
             <a:fld id="{3A07B820-47FA-134C-9439-E1785E2AFBF4}" type="slidenum">
               <a:rPr lang="en-US" smtClean="0"/>
+              <a:pPr/>
               <a:t>22</a:t>
             </a:fld>
             <a:endParaRPr lang="en-US"/>
@@ -1701,6 +1714,7 @@
           <a:p>
             <a:fld id="{3A07B820-47FA-134C-9439-E1785E2AFBF4}" type="slidenum">
               <a:rPr lang="en-US" smtClean="0"/>
+              <a:pPr/>
               <a:t>4</a:t>
             </a:fld>
             <a:endParaRPr lang="en-US"/>
@@ -1814,6 +1828,7 @@
           <a:p>
             <a:fld id="{3A07B820-47FA-134C-9439-E1785E2AFBF4}" type="slidenum">
               <a:rPr lang="en-US" smtClean="0"/>
+              <a:pPr/>
               <a:t>23</a:t>
             </a:fld>
             <a:endParaRPr lang="en-US"/>
@@ -1902,6 +1917,7 @@
           <a:p>
             <a:fld id="{3A07B820-47FA-134C-9439-E1785E2AFBF4}" type="slidenum">
               <a:rPr lang="en-US" smtClean="0"/>
+              <a:pPr/>
               <a:t>24</a:t>
             </a:fld>
             <a:endParaRPr lang="en-US"/>
@@ -1991,6 +2007,7 @@
           <a:p>
             <a:fld id="{3A07B820-47FA-134C-9439-E1785E2AFBF4}" type="slidenum">
               <a:rPr lang="en-US" smtClean="0"/>
+              <a:pPr/>
               <a:t>25</a:t>
             </a:fld>
             <a:endParaRPr lang="en-US"/>
@@ -2086,6 +2103,7 @@
           <a:p>
             <a:fld id="{3A07B820-47FA-134C-9439-E1785E2AFBF4}" type="slidenum">
               <a:rPr lang="en-US" smtClean="0"/>
+              <a:pPr/>
               <a:t>26</a:t>
             </a:fld>
             <a:endParaRPr lang="en-US"/>
@@ -2217,6 +2235,7 @@
           <a:p>
             <a:fld id="{3A07B820-47FA-134C-9439-E1785E2AFBF4}" type="slidenum">
               <a:rPr lang="en-US" smtClean="0"/>
+              <a:pPr/>
               <a:t>27</a:t>
             </a:fld>
             <a:endParaRPr lang="en-US"/>
@@ -2308,6 +2327,7 @@
           <a:p>
             <a:fld id="{3A07B820-47FA-134C-9439-E1785E2AFBF4}" type="slidenum">
               <a:rPr lang="en-US" smtClean="0"/>
+              <a:pPr/>
               <a:t>28</a:t>
             </a:fld>
             <a:endParaRPr lang="en-US"/>
@@ -2393,6 +2413,7 @@
           <a:p>
             <a:fld id="{3A07B820-47FA-134C-9439-E1785E2AFBF4}" type="slidenum">
               <a:rPr lang="en-US" smtClean="0"/>
+              <a:pPr/>
               <a:t>29</a:t>
             </a:fld>
             <a:endParaRPr lang="en-US"/>
@@ -2522,6 +2543,7 @@
           <a:p>
             <a:fld id="{3A07B820-47FA-134C-9439-E1785E2AFBF4}" type="slidenum">
               <a:rPr lang="en-US" smtClean="0"/>
+              <a:pPr/>
               <a:t>30</a:t>
             </a:fld>
             <a:endParaRPr lang="en-US"/>
@@ -2607,6 +2629,7 @@
           <a:p>
             <a:fld id="{3A07B820-47FA-134C-9439-E1785E2AFBF4}" type="slidenum">
               <a:rPr lang="en-US" smtClean="0"/>
+              <a:pPr/>
               <a:t>31</a:t>
             </a:fld>
             <a:endParaRPr lang="en-US"/>
@@ -2702,6 +2725,7 @@
           <a:p>
             <a:fld id="{3A07B820-47FA-134C-9439-E1785E2AFBF4}" type="slidenum">
               <a:rPr lang="en-US" smtClean="0"/>
+              <a:pPr/>
               <a:t>32</a:t>
             </a:fld>
             <a:endParaRPr lang="en-US"/>
@@ -2791,6 +2815,7 @@
           <a:p>
             <a:fld id="{3A07B820-47FA-134C-9439-E1785E2AFBF4}" type="slidenum">
               <a:rPr lang="en-US" smtClean="0"/>
+              <a:pPr/>
               <a:t>5</a:t>
             </a:fld>
             <a:endParaRPr lang="en-US"/>
@@ -2880,7 +2905,158 @@
           <a:p>
             <a:fld id="{3A07B820-47FA-134C-9439-E1785E2AFBF4}" type="slidenum">
               <a:rPr lang="en-US" smtClean="0"/>
+              <a:pPr/>
               <a:t>33</a:t>
+            </a:fld>
+            <a:endParaRPr lang="en-US"/>
+          </a:p>
+        </p:txBody>
+      </p:sp>
+    </p:spTree>
+  </p:cSld>
+  <p:clrMapOvr>
+    <a:masterClrMapping/>
+  </p:clrMapOvr>
+</p:notes>
+</file>
+
+<file path=ppt/notesSlides/notesSlide31.xml><?xml version="1.0" encoding="utf-8"?>
+<p:notes xmlns:a="http://schemas.openxmlformats.org/drawingml/2006/main" xmlns:r="http://schemas.openxmlformats.org/officeDocument/2006/relationships" xmlns:mc="http://schemas.openxmlformats.org/markup-compatibility/2006" xmlns:mv="urn:schemas-microsoft-com:mac:vml" xmlns:p="http://schemas.openxmlformats.org/presentationml/2006/main" mc:Ignorable="mv" mc:PreserveAttributes="mv:*">
+  <p:cSld>
+    <p:spTree>
+      <p:nvGrpSpPr>
+        <p:cNvPr id="1" name=""/>
+        <p:cNvGrpSpPr/>
+        <p:nvPr/>
+      </p:nvGrpSpPr>
+      <p:grpSpPr>
+        <a:xfrm>
+          <a:off x="0" y="0"/>
+          <a:ext cx="0" cy="0"/>
+          <a:chOff x="0" y="0"/>
+          <a:chExt cx="0" cy="0"/>
+        </a:xfrm>
+      </p:grpSpPr>
+      <p:sp>
+        <p:nvSpPr>
+          <p:cNvPr id="2" name="Slide Image Placeholder 1"/>
+          <p:cNvSpPr>
+            <a:spLocks noGrp="1" noRot="1" noChangeAspect="1"/>
+          </p:cNvSpPr>
+          <p:nvPr>
+            <p:ph type="sldImg"/>
+          </p:nvPr>
+        </p:nvSpPr>
+        <p:spPr/>
+      </p:sp>
+      <p:sp>
+        <p:nvSpPr>
+          <p:cNvPr id="3" name="Notes Placeholder 2"/>
+          <p:cNvSpPr>
+            <a:spLocks noGrp="1"/>
+          </p:cNvSpPr>
+          <p:nvPr>
+            <p:ph type="body" idx="1"/>
+          </p:nvPr>
+        </p:nvSpPr>
+        <p:spPr/>
+        <p:txBody>
+          <a:bodyPr>
+            <a:normAutofit/>
+          </a:bodyPr>
+          <a:lstStyle/>
+          <a:p>
+            <a:r>
+              <a:rPr lang="en-US" dirty="0" smtClean="0"/>
+              <a:t>Resources:</a:t>
+            </a:r>
+          </a:p>
+          <a:p>
+            <a:r>
+              <a:rPr lang="en-US" dirty="0" smtClean="0"/>
+              <a:t>Fail whale:</a:t>
+            </a:r>
+            <a:r>
+              <a:rPr lang="en-US" baseline="0" dirty="0" smtClean="0"/>
+              <a:t> http://</a:t>
+            </a:r>
+            <a:r>
+              <a:rPr lang="en-US" baseline="0" dirty="0" err="1" smtClean="0"/>
+              <a:t>upload.wikimedia.org/wikipedia/en/d/de/Failwhale.png</a:t>
+            </a:r>
+            <a:endParaRPr lang="en-US" baseline="0" dirty="0" smtClean="0"/>
+          </a:p>
+          <a:p>
+            <a:r>
+              <a:rPr lang="en-US" baseline="0" dirty="0" smtClean="0"/>
+              <a:t>Cheeseburger: http://www.iconarchive.com/icons/aha-soft/food/256/burger-icon.png</a:t>
+            </a:r>
+          </a:p>
+          <a:p>
+            <a:r>
+              <a:rPr lang="en-US" baseline="0" dirty="0" smtClean="0"/>
+              <a:t>Light: http://www.flickr.com/photos/mr_beaver/3486761520/</a:t>
+            </a:r>
+          </a:p>
+          <a:p>
+            <a:r>
+              <a:rPr lang="en-US" baseline="0" dirty="0" smtClean="0"/>
+              <a:t>Document: http://icons2.iconarchive.com/icons/deleket/sleek-xp-basic/256/Document-icon.png</a:t>
+            </a:r>
+          </a:p>
+          <a:p>
+            <a:r>
+              <a:rPr lang="en-US" dirty="0" err="1" smtClean="0"/>
+              <a:t>MongoDB</a:t>
+            </a:r>
+            <a:r>
+              <a:rPr lang="en-US" dirty="0" smtClean="0"/>
+              <a:t> Logo: </a:t>
+            </a:r>
+            <a:r>
+              <a:rPr lang="en-US" dirty="0" err="1" smtClean="0"/>
+              <a:t>http://mongo-db.appspot.com/static/images/logo-mongodb-onwhite.png</a:t>
+            </a:r>
+            <a:endParaRPr lang="en-US" dirty="0" smtClean="0"/>
+          </a:p>
+          <a:p>
+            <a:r>
+              <a:rPr lang="en-US" dirty="0" smtClean="0"/>
+              <a:t>Red and Black</a:t>
+            </a:r>
+            <a:r>
+              <a:rPr lang="en-US" baseline="0" dirty="0" smtClean="0"/>
+              <a:t> Birds: http://www.inspiredm.com/2009/04/12/the-social-bird-icon-set-the-first-inspired-release/</a:t>
+            </a:r>
+          </a:p>
+          <a:p>
+            <a:r>
+              <a:rPr lang="en-US" baseline="0" smtClean="0"/>
+              <a:t>Twitter Bird: http://www.truerwords.net/6118/enclosure/twitterific.png</a:t>
+            </a:r>
+            <a:endParaRPr lang="en-US" dirty="0"/>
+          </a:p>
+        </p:txBody>
+      </p:sp>
+      <p:sp>
+        <p:nvSpPr>
+          <p:cNvPr id="4" name="Slide Number Placeholder 3"/>
+          <p:cNvSpPr>
+            <a:spLocks noGrp="1"/>
+          </p:cNvSpPr>
+          <p:nvPr>
+            <p:ph type="sldNum" sz="quarter" idx="10"/>
+          </p:nvPr>
+        </p:nvSpPr>
+        <p:spPr/>
+        <p:txBody>
+          <a:bodyPr/>
+          <a:lstStyle/>
+          <a:p>
+            <a:fld id="{3A07B820-47FA-134C-9439-E1785E2AFBF4}" type="slidenum">
+              <a:rPr lang="en-US" smtClean="0"/>
+              <a:pPr/>
+              <a:t>34</a:t>
             </a:fld>
             <a:endParaRPr lang="en-US"/>
           </a:p>
@@ -2977,6 +3153,7 @@
           <a:p>
             <a:fld id="{3A07B820-47FA-134C-9439-E1785E2AFBF4}" type="slidenum">
               <a:rPr lang="en-US" smtClean="0"/>
+              <a:pPr/>
               <a:t>6</a:t>
             </a:fld>
             <a:endParaRPr lang="en-US"/>
@@ -3062,6 +3239,7 @@
           <a:p>
             <a:fld id="{3A07B820-47FA-134C-9439-E1785E2AFBF4}" type="slidenum">
               <a:rPr lang="en-US" smtClean="0"/>
+              <a:pPr/>
               <a:t>7</a:t>
             </a:fld>
             <a:endParaRPr lang="en-US"/>
@@ -3169,6 +3347,7 @@
           <a:p>
             <a:fld id="{3A07B820-47FA-134C-9439-E1785E2AFBF4}" type="slidenum">
               <a:rPr lang="en-US" smtClean="0"/>
+              <a:pPr/>
               <a:t>8</a:t>
             </a:fld>
             <a:endParaRPr lang="en-US"/>
@@ -3249,12 +3428,6 @@
           <a:p>
             <a:r>
               <a:rPr lang="en-US" dirty="0" smtClean="0"/>
-              <a:t>MEH</a:t>
-            </a:r>
-          </a:p>
-          <a:p>
-            <a:r>
-              <a:rPr lang="en-US" dirty="0" smtClean="0"/>
               <a:t>Get RID of it!</a:t>
             </a:r>
           </a:p>
@@ -3314,6 +3487,7 @@
           <a:p>
             <a:fld id="{3A07B820-47FA-134C-9439-E1785E2AFBF4}" type="slidenum">
               <a:rPr lang="en-US" smtClean="0"/>
+              <a:pPr/>
               <a:t>9</a:t>
             </a:fld>
             <a:endParaRPr lang="en-US"/>
@@ -3409,6 +3583,7 @@
           <a:p>
             <a:fld id="{3A07B820-47FA-134C-9439-E1785E2AFBF4}" type="slidenum">
               <a:rPr lang="en-US" smtClean="0"/>
+              <a:pPr/>
               <a:t>11</a:t>
             </a:fld>
             <a:endParaRPr lang="en-US"/>
@@ -3521,6 +3696,7 @@
           <a:p>
             <a:fld id="{3A07B820-47FA-134C-9439-E1785E2AFBF4}" type="slidenum">
               <a:rPr lang="en-US" smtClean="0"/>
+              <a:pPr/>
               <a:t>12</a:t>
             </a:fld>
             <a:endParaRPr lang="en-US"/>
@@ -7843,28 +8019,14 @@
                 <a:latin typeface="Consolas"/>
                 <a:cs typeface="Consolas"/>
               </a:rPr>
-              <a:t>tags:</a:t>
-            </a:r>
-            <a:r>
-              <a:rPr lang="en-US" sz="2400" dirty="0" err="1" smtClean="0">
-                <a:latin typeface="Consolas"/>
-                <a:cs typeface="Consolas"/>
-              </a:rPr>
-              <a:t>[‘paystub</a:t>
+              <a:t>tags:[‘paystub</a:t>
             </a:r>
             <a:r>
               <a:rPr lang="en-US" sz="2400" dirty="0" smtClean="0">
                 <a:latin typeface="Consolas"/>
                 <a:cs typeface="Consolas"/>
               </a:rPr>
-              <a:t>’]</a:t>
-            </a:r>
-            <a:r>
-              <a:rPr lang="en-US" sz="2400" dirty="0" smtClean="0">
-                <a:latin typeface="Consolas"/>
-                <a:cs typeface="Consolas"/>
-              </a:rPr>
-              <a:t>,</a:t>
+              <a:t>’],</a:t>
             </a:r>
           </a:p>
           <a:p>
@@ -8111,7 +8273,21 @@
                 <a:latin typeface="Consolas"/>
                 <a:cs typeface="Consolas"/>
               </a:rPr>
-              <a:t>  tags:[],</a:t>
+              <a:t>  </a:t>
+            </a:r>
+            <a:r>
+              <a:rPr lang="en-US" sz="2400" dirty="0" err="1" smtClean="0">
+                <a:latin typeface="Consolas"/>
+                <a:cs typeface="Consolas"/>
+              </a:rPr>
+              <a:t>tags:[‘paystub</a:t>
+            </a:r>
+            <a:r>
+              <a:rPr lang="en-US" sz="2400" dirty="0" smtClean="0">
+                <a:latin typeface="Consolas"/>
+                <a:cs typeface="Consolas"/>
+              </a:rPr>
+              <a:t>’],</a:t>
             </a:r>
           </a:p>
           <a:p>
@@ -8342,7 +8518,7 @@
         <p:spPr>
           <a:xfrm>
             <a:off x="2133600" y="4419600"/>
-            <a:ext cx="3886200" cy="381000"/>
+            <a:ext cx="4724400" cy="381000"/>
           </a:xfrm>
           <a:prstGeom prst="rect">
             <a:avLst/>
@@ -8539,7 +8715,21 @@
                 <a:latin typeface="Consolas"/>
                 <a:cs typeface="Consolas"/>
               </a:rPr>
-              <a:t>  content: &lt;SHA1 of file&gt;});</a:t>
+              <a:t>  </a:t>
+            </a:r>
+            <a:r>
+              <a:rPr lang="en-US" sz="2400" dirty="0" err="1" smtClean="0">
+                <a:latin typeface="Consolas"/>
+                <a:cs typeface="Consolas"/>
+              </a:rPr>
+              <a:t>grid_fs_name</a:t>
+            </a:r>
+            <a:r>
+              <a:rPr lang="en-US" sz="2400" dirty="0" smtClean="0">
+                <a:latin typeface="Consolas"/>
+                <a:cs typeface="Consolas"/>
+              </a:rPr>
+              <a:t>: &lt;SHA1 of file&gt;});</a:t>
             </a:r>
             <a:endParaRPr lang="en-US" sz="2400" dirty="0">
               <a:latin typeface="Consolas"/>
@@ -9378,21 +9568,7 @@
                 <a:latin typeface="Consolas"/>
                 <a:cs typeface="Consolas"/>
               </a:rPr>
-              <a:t>db.papers.find({date:’3/2/2010</a:t>
-            </a:r>
-            <a:r>
-              <a:rPr lang="en-US" sz="2400" dirty="0" smtClean="0">
-                <a:latin typeface="Consolas"/>
-                <a:cs typeface="Consolas"/>
-              </a:rPr>
-              <a:t>’})</a:t>
-            </a:r>
-            <a:r>
-              <a:rPr lang="en-US" sz="2400" dirty="0" smtClean="0">
-                <a:latin typeface="Consolas"/>
-                <a:cs typeface="Consolas"/>
-              </a:rPr>
-              <a:t>;</a:t>
+              <a:t>db.papers.find({date:’3/2/2010’});</a:t>
             </a:r>
             <a:endParaRPr lang="en-US" sz="2400" dirty="0">
               <a:latin typeface="Consolas"/>
@@ -9560,21 +9736,7 @@
                 <a:latin typeface="Consolas"/>
                 <a:cs typeface="Consolas"/>
               </a:rPr>
-              <a:t>db.papers.find({date:’3/2/2010</a:t>
-            </a:r>
-            <a:r>
-              <a:rPr lang="en-US" sz="2400" dirty="0" smtClean="0">
-                <a:latin typeface="Consolas"/>
-                <a:cs typeface="Consolas"/>
-              </a:rPr>
-              <a:t>’})</a:t>
-            </a:r>
-            <a:r>
-              <a:rPr lang="en-US" sz="2400" dirty="0" smtClean="0">
-                <a:latin typeface="Consolas"/>
-                <a:cs typeface="Consolas"/>
-              </a:rPr>
-              <a:t>;</a:t>
+              <a:t>db.papers.find({date:’3/2/2010’});</a:t>
             </a:r>
             <a:endParaRPr lang="en-US" sz="2400" dirty="0">
               <a:latin typeface="Consolas"/>
@@ -9617,14 +9779,7 @@
                 <a:latin typeface="Consolas"/>
                 <a:cs typeface="Consolas"/>
               </a:rPr>
-              <a:t>’})</a:t>
-            </a:r>
-            <a:r>
-              <a:rPr lang="en-US" sz="2400" dirty="0" smtClean="0">
-                <a:latin typeface="Consolas"/>
-                <a:cs typeface="Consolas"/>
-              </a:rPr>
-              <a:t>;</a:t>
+              <a:t>’});</a:t>
             </a:r>
             <a:endParaRPr lang="en-US" sz="2400" dirty="0">
               <a:latin typeface="Consolas"/>
@@ -9792,14 +9947,7 @@
                 <a:latin typeface="Consolas"/>
                 <a:cs typeface="Consolas"/>
               </a:rPr>
-              <a:t>’})</a:t>
-            </a:r>
-            <a:r>
-              <a:rPr lang="en-US" sz="2400" dirty="0" smtClean="0">
-                <a:latin typeface="Consolas"/>
-                <a:cs typeface="Consolas"/>
-              </a:rPr>
-              <a:t>;</a:t>
+              <a:t>’});</a:t>
             </a:r>
             <a:endParaRPr lang="en-US" sz="2400" dirty="0">
               <a:latin typeface="Consolas"/>
@@ -11470,7 +11618,7 @@
           <p:nvPr/>
         </p:nvPicPr>
         <p:blipFill>
-          <a:blip r:embed="rId2" cstate="print">
+          <a:blip r:embed="rId3" cstate="print">
             <a:alphaModFix amt="75000"/>
           </a:blip>
           <a:srcRect/>
@@ -11661,24 +11809,7 @@
                 <a:ea typeface="+mj-ea"/>
                 <a:cs typeface="+mj-cs"/>
               </a:rPr>
-              <a:t>ithub.com/jonfuller/</a:t>
-            </a:r>
-            <a:r>
-              <a:rPr kumimoji="0" lang="en-US" sz="4400" b="0" i="0" u="none" strike="noStrike" kern="1200" cap="none" spc="0" normalizeH="0" baseline="0" noProof="0" dirty="0" err="1" smtClean="0">
-                <a:ln>
-                  <a:noFill/>
-                </a:ln>
-                <a:solidFill>
-                  <a:schemeClr val="tx1"/>
-                </a:solidFill>
-                <a:effectLst/>
-                <a:uLnTx/>
-                <a:uFillTx/>
-                <a:latin typeface="+mj-lt"/>
-                <a:ea typeface="+mj-ea"/>
-                <a:cs typeface="+mj-cs"/>
-              </a:rPr>
-              <a:t>paperless</a:t>
+              <a:t>ithub.com/jonfuller/paperless</a:t>
             </a:r>
             <a:endParaRPr kumimoji="0" lang="en-US" sz="4400" b="0" i="0" u="none" strike="noStrike" kern="1200" cap="none" spc="0" normalizeH="0" baseline="0" noProof="0" dirty="0" smtClean="0">
               <a:ln>
@@ -11841,24 +11972,7 @@
                 <a:ea typeface="+mj-ea"/>
                 <a:cs typeface="+mj-cs"/>
               </a:rPr>
-              <a:t>ithub.com/jonfuller</a:t>
-            </a:r>
-            <a:r>
-              <a:rPr kumimoji="0" lang="en-US" sz="4400" b="0" i="0" u="none" strike="noStrike" kern="1200" cap="none" spc="0" normalizeH="0" baseline="0" noProof="0" dirty="0" err="1" smtClean="0">
-                <a:ln>
-                  <a:noFill/>
-                </a:ln>
-                <a:solidFill>
-                  <a:schemeClr val="tx1"/>
-                </a:solidFill>
-                <a:effectLst/>
-                <a:uLnTx/>
-                <a:uFillTx/>
-                <a:latin typeface="+mj-lt"/>
-                <a:ea typeface="+mj-ea"/>
-                <a:cs typeface="+mj-cs"/>
-              </a:rPr>
-              <a:t>/mongo</a:t>
+              <a:t>ithub.com/jonfuller/mongo</a:t>
             </a:r>
             <a:r>
               <a:rPr kumimoji="0" lang="en-US" sz="4400" b="0" i="0" u="none" strike="noStrike" kern="1200" cap="none" spc="0" normalizeH="0" baseline="0" noProof="0" dirty="0" smtClean="0">
@@ -11877,20 +11991,6 @@
               </a:rPr>
               <a:t>-presentation</a:t>
             </a:r>
-            <a:endParaRPr kumimoji="0" lang="en-US" sz="4400" b="0" i="0" u="none" strike="noStrike" kern="1200" cap="none" spc="0" normalizeH="0" baseline="0" noProof="0" dirty="0" smtClean="0">
-              <a:ln>
-                <a:noFill/>
-              </a:ln>
-              <a:solidFill>
-                <a:schemeClr val="tx1"/>
-              </a:solidFill>
-              <a:effectLst/>
-              <a:uLnTx/>
-              <a:uFillTx/>
-              <a:latin typeface="+mj-lt"/>
-              <a:ea typeface="+mj-ea"/>
-              <a:cs typeface="+mj-cs"/>
-            </a:endParaRPr>
           </a:p>
         </p:txBody>
       </p:sp>

</xml_diff>